<commit_message>
fix: remove double-plus sign in revenue growth formatting
_fmt() was combining a manual prefix="+" with Python's :+ format specifier,
producing "++3.4%" instead of "+3.4%".

Co-Authored-By: Claude Opus 4.6 <noreply@anthropic.com>
</commit_message>
<xml_diff>
--- a/data/output/group/blm_niel_group_consolidated_cq4_2025.pptx
+++ b/data/output/group/blm_niel_group_consolidated_cq4_2025.pptx
@@ -32822,7 +32822,7 @@
               </a:defRPr>
             </a:pPr>
             <a:r>
-              <a:t>Cyprus: Rev 33.0M, Margin 39.4%, Growth ++10.0%</a:t>
+              <a:t>Cyprus: Rev 33.0M, Margin 39.4%, Growth +10.0%</a:t>
             </a:r>
           </a:p>
         </p:txBody>
@@ -32858,7 +32858,7 @@
               </a:defRPr>
             </a:pPr>
             <a:r>
-              <a:t>Ireland: Rev 345.0M, Margin 46.1%, Growth ++4.5%</a:t>
+              <a:t>Ireland: Rev 345.0M, Margin 46.1%, Growth +4.5%</a:t>
             </a:r>
           </a:p>
         </p:txBody>
@@ -32894,7 +32894,7 @@
               </a:defRPr>
             </a:pPr>
             <a:r>
-              <a:t>Malta: Rev 10.0M, Margin 30.0%, Growth ++11.1%</a:t>
+              <a:t>Malta: Rev 10.0M, Margin 30.0%, Growth +11.1%</a:t>
             </a:r>
           </a:p>
         </p:txBody>
@@ -32930,7 +32930,7 @@
               </a:defRPr>
             </a:pPr>
             <a:r>
-              <a:t>Switzerland: Rev 245.0M, Margin 58.8%, Growth ++3.4%</a:t>
+              <a:t>Switzerland: Rev 245.0M, Margin 58.8%, Growth +3.4%</a:t>
             </a:r>
           </a:p>
         </p:txBody>
@@ -32966,7 +32966,7 @@
               </a:defRPr>
             </a:pPr>
             <a:r>
-              <a:t>Ukraine: Rev 3,800M, Margin 55.8%, Growth ++24.6%</a:t>
+              <a:t>Ukraine: Rev 3,800M, Margin 55.8%, Growth +24.6%</a:t>
             </a:r>
           </a:p>
         </p:txBody>
@@ -33516,7 +33516,7 @@
               </a:defRPr>
             </a:pPr>
             <a:r>
-              <a:t>France: Rev 1,740M, Margin 42.0%, Growth ++2.2%</a:t>
+              <a:t>France: Rev 1,740M, Margin 42.0%, Growth +2.2%</a:t>
             </a:r>
           </a:p>
         </p:txBody>
@@ -33552,7 +33552,7 @@
               </a:defRPr>
             </a:pPr>
             <a:r>
-              <a:t>Italy: Rev 325.0M, Margin 33.2%, Growth ++7.6%</a:t>
+              <a:t>Italy: Rev 325.0M, Margin 33.2%, Growth +7.6%</a:t>
             </a:r>
           </a:p>
         </p:txBody>
@@ -33588,7 +33588,7 @@
               </a:defRPr>
             </a:pPr>
             <a:r>
-              <a:t>Poland: Rev 2,730M, Margin 40.3%, Growth ++3.4%</a:t>
+              <a:t>Poland: Rev 2,730M, Margin 40.3%, Growth +3.4%</a:t>
             </a:r>
           </a:p>
         </p:txBody>
@@ -34138,7 +34138,7 @@
               </a:defRPr>
             </a:pPr>
             <a:r>
-              <a:t>Bolivia: Rev 1,890M, Margin 42.6%, Growth ++6.8%</a:t>
+              <a:t>Bolivia: Rev 1,890M, Margin 42.6%, Growth +6.8%</a:t>
             </a:r>
           </a:p>
         </p:txBody>
@@ -34174,7 +34174,7 @@
               </a:defRPr>
             </a:pPr>
             <a:r>
-              <a:t>Colombia: Rev 2,420M, Margin 35.1%, Growth ++7.1%</a:t>
+              <a:t>Colombia: Rev 2,420M, Margin 35.1%, Growth +7.1%</a:t>
             </a:r>
           </a:p>
         </p:txBody>
@@ -34210,7 +34210,7 @@
               </a:defRPr>
             </a:pPr>
             <a:r>
-              <a:t>Ecuador: Rev 355.0M, Margin 32.7%, Growth ++6.0%</a:t>
+              <a:t>Ecuador: Rev 355.0M, Margin 32.7%, Growth +6.0%</a:t>
             </a:r>
           </a:p>
         </p:txBody>
@@ -34246,7 +34246,7 @@
               </a:defRPr>
             </a:pPr>
             <a:r>
-              <a:t>El Salvador: Rev 139.0M, Margin 42.4%, Growth ++6.1%</a:t>
+              <a:t>El Salvador: Rev 139.0M, Margin 42.4%, Growth +6.1%</a:t>
             </a:r>
           </a:p>
         </p:txBody>
@@ -34282,7 +34282,7 @@
               </a:defRPr>
             </a:pPr>
             <a:r>
-              <a:t>Guatemala: Rev 4,350M, Margin 45.1%, Growth ++7.4%</a:t>
+              <a:t>Guatemala: Rev 4,350M, Margin 45.1%, Growth +7.4%</a:t>
             </a:r>
           </a:p>
         </p:txBody>
@@ -34318,7 +34318,7 @@
               </a:defRPr>
             </a:pPr>
             <a:r>
-              <a:t>Honduras: Rev 4,760M, Margin 45.0%, Growth ++7.2%</a:t>
+              <a:t>Honduras: Rev 4,760M, Margin 45.0%, Growth +7.2%</a:t>
             </a:r>
           </a:p>
         </p:txBody>
@@ -34354,7 +34354,7 @@
               </a:defRPr>
             </a:pPr>
             <a:r>
-              <a:t>Nicaragua: Rev 2,410M, Margin 45.0%, Growth ++5.2%</a:t>
+              <a:t>Nicaragua: Rev 2,410M, Margin 45.0%, Growth +5.2%</a:t>
             </a:r>
           </a:p>
         </p:txBody>
@@ -34390,7 +34390,7 @@
               </a:defRPr>
             </a:pPr>
             <a:r>
-              <a:t>Panama: Rev 161.0M, Margin 43.5%, Growth ++8.1%</a:t>
+              <a:t>Panama: Rev 161.0M, Margin 43.5%, Growth +8.1%</a:t>
             </a:r>
           </a:p>
         </p:txBody>
@@ -34426,7 +34426,7 @@
               </a:defRPr>
             </a:pPr>
             <a:r>
-              <a:t>Paraguay: Rev 2,060M, Margin 45.1%, Growth ++6.2%</a:t>
+              <a:t>Paraguay: Rev 2,060M, Margin 45.1%, Growth +6.2%</a:t>
             </a:r>
           </a:p>
         </p:txBody>
@@ -34462,7 +34462,7 @@
               </a:defRPr>
             </a:pPr>
             <a:r>
-              <a:t>Uruguay: Rev 2,010M, Margin 30.0%, Growth ++6.3%</a:t>
+              <a:t>Uruguay: Rev 2,010M, Margin 30.0%, Growth +6.3%</a:t>
             </a:r>
           </a:p>
         </p:txBody>

</xml_diff>